<commit_message>
ppt aminek nagyon sok köze van a weboldalunkhoz :'D
ez egy nagyon fontos ppt ami nélkül nem működik az oldal
</commit_message>
<xml_diff>
--- a/Hash Tábla Algoritmisok.pptx
+++ b/Hash Tábla Algoritmisok.pptx
@@ -10,6 +10,12 @@
     <p:sldId id="258" r:id="rId4"/>
     <p:sldId id="259" r:id="rId5"/>
     <p:sldId id="260" r:id="rId6"/>
+    <p:sldId id="261" r:id="rId7"/>
+    <p:sldId id="262" r:id="rId8"/>
+    <p:sldId id="263" r:id="rId9"/>
+    <p:sldId id="264" r:id="rId10"/>
+    <p:sldId id="265" r:id="rId11"/>
+    <p:sldId id="266" r:id="rId12"/>
   </p:sldIdLst>
   <p:sldSz cx="12192000" cy="6858000"/>
   <p:notesSz cx="6858000" cy="9144000"/>
@@ -299,7 +305,7 @@
           <a:p>
             <a:fld id="{3A7CF2C3-5083-43BA-9164-0E9844C185D4}" type="datetimeFigureOut">
               <a:rPr lang="en-AU" smtClean="0"/>
-              <a:t>12/12/2016</a:t>
+              <a:t>13/12/2016</a:t>
             </a:fld>
             <a:endParaRPr lang="en-AU"/>
           </a:p>
@@ -637,7 +643,7 @@
           <a:p>
             <a:fld id="{3A7CF2C3-5083-43BA-9164-0E9844C185D4}" type="datetimeFigureOut">
               <a:rPr lang="en-AU" smtClean="0"/>
-              <a:t>12/12/2016</a:t>
+              <a:t>13/12/2016</a:t>
             </a:fld>
             <a:endParaRPr lang="en-AU"/>
           </a:p>
@@ -1038,7 +1044,7 @@
           <a:p>
             <a:fld id="{3A7CF2C3-5083-43BA-9164-0E9844C185D4}" type="datetimeFigureOut">
               <a:rPr lang="en-AU" smtClean="0"/>
-              <a:t>12/12/2016</a:t>
+              <a:t>13/12/2016</a:t>
             </a:fld>
             <a:endParaRPr lang="en-AU"/>
           </a:p>
@@ -1374,7 +1380,7 @@
           <a:p>
             <a:fld id="{3A7CF2C3-5083-43BA-9164-0E9844C185D4}" type="datetimeFigureOut">
               <a:rPr lang="en-AU" smtClean="0"/>
-              <a:t>12/12/2016</a:t>
+              <a:t>13/12/2016</a:t>
             </a:fld>
             <a:endParaRPr lang="en-AU"/>
           </a:p>
@@ -1694,7 +1700,7 @@
           <a:p>
             <a:fld id="{3A7CF2C3-5083-43BA-9164-0E9844C185D4}" type="datetimeFigureOut">
               <a:rPr lang="en-AU" smtClean="0"/>
-              <a:t>12/12/2016</a:t>
+              <a:t>13/12/2016</a:t>
             </a:fld>
             <a:endParaRPr lang="en-AU"/>
           </a:p>
@@ -2090,7 +2096,7 @@
           <a:p>
             <a:fld id="{3A7CF2C3-5083-43BA-9164-0E9844C185D4}" type="datetimeFigureOut">
               <a:rPr lang="en-AU" smtClean="0"/>
-              <a:t>12/12/2016</a:t>
+              <a:t>13/12/2016</a:t>
             </a:fld>
             <a:endParaRPr lang="en-AU"/>
           </a:p>
@@ -2347,7 +2353,7 @@
           <a:p>
             <a:fld id="{3A7CF2C3-5083-43BA-9164-0E9844C185D4}" type="datetimeFigureOut">
               <a:rPr lang="en-AU" smtClean="0"/>
-              <a:t>12/12/2016</a:t>
+              <a:t>13/12/2016</a:t>
             </a:fld>
             <a:endParaRPr lang="en-AU"/>
           </a:p>
@@ -2609,7 +2615,7 @@
           <a:p>
             <a:fld id="{3A7CF2C3-5083-43BA-9164-0E9844C185D4}" type="datetimeFigureOut">
               <a:rPr lang="en-AU" smtClean="0"/>
-              <a:t>12/12/2016</a:t>
+              <a:t>13/12/2016</a:t>
             </a:fld>
             <a:endParaRPr lang="en-AU"/>
           </a:p>
@@ -2871,7 +2877,7 @@
           <a:p>
             <a:fld id="{3A7CF2C3-5083-43BA-9164-0E9844C185D4}" type="datetimeFigureOut">
               <a:rPr lang="en-AU" smtClean="0"/>
-              <a:t>12/12/2016</a:t>
+              <a:t>13/12/2016</a:t>
             </a:fld>
             <a:endParaRPr lang="en-AU"/>
           </a:p>
@@ -3200,7 +3206,7 @@
           <a:p>
             <a:fld id="{3A7CF2C3-5083-43BA-9164-0E9844C185D4}" type="datetimeFigureOut">
               <a:rPr lang="en-AU" smtClean="0"/>
-              <a:t>12/12/2016</a:t>
+              <a:t>13/12/2016</a:t>
             </a:fld>
             <a:endParaRPr lang="en-AU"/>
           </a:p>
@@ -3523,7 +3529,7 @@
           <a:p>
             <a:fld id="{3A7CF2C3-5083-43BA-9164-0E9844C185D4}" type="datetimeFigureOut">
               <a:rPr lang="en-AU" smtClean="0"/>
-              <a:t>12/12/2016</a:t>
+              <a:t>13/12/2016</a:t>
             </a:fld>
             <a:endParaRPr lang="en-AU"/>
           </a:p>
@@ -3980,7 +3986,7 @@
           <a:p>
             <a:fld id="{3A7CF2C3-5083-43BA-9164-0E9844C185D4}" type="datetimeFigureOut">
               <a:rPr lang="en-AU" smtClean="0"/>
-              <a:t>12/12/2016</a:t>
+              <a:t>13/12/2016</a:t>
             </a:fld>
             <a:endParaRPr lang="en-AU"/>
           </a:p>
@@ -4185,7 +4191,7 @@
           <a:p>
             <a:fld id="{3A7CF2C3-5083-43BA-9164-0E9844C185D4}" type="datetimeFigureOut">
               <a:rPr lang="en-AU" smtClean="0"/>
-              <a:t>12/12/2016</a:t>
+              <a:t>13/12/2016</a:t>
             </a:fld>
             <a:endParaRPr lang="en-AU"/>
           </a:p>
@@ -4362,7 +4368,7 @@
           <a:p>
             <a:fld id="{3A7CF2C3-5083-43BA-9164-0E9844C185D4}" type="datetimeFigureOut">
               <a:rPr lang="en-AU" smtClean="0"/>
-              <a:t>12/12/2016</a:t>
+              <a:t>13/12/2016</a:t>
             </a:fld>
             <a:endParaRPr lang="en-AU"/>
           </a:p>
@@ -4695,7 +4701,7 @@
           <a:p>
             <a:fld id="{3A7CF2C3-5083-43BA-9164-0E9844C185D4}" type="datetimeFigureOut">
               <a:rPr lang="en-AU" smtClean="0"/>
-              <a:t>12/12/2016</a:t>
+              <a:t>13/12/2016</a:t>
             </a:fld>
             <a:endParaRPr lang="en-AU"/>
           </a:p>
@@ -5040,7 +5046,7 @@
           <a:p>
             <a:fld id="{3A7CF2C3-5083-43BA-9164-0E9844C185D4}" type="datetimeFigureOut">
               <a:rPr lang="en-AU" smtClean="0"/>
-              <a:t>12/12/2016</a:t>
+              <a:t>13/12/2016</a:t>
             </a:fld>
             <a:endParaRPr lang="en-AU"/>
           </a:p>
@@ -7157,7 +7163,7 @@
           <a:p>
             <a:fld id="{3A7CF2C3-5083-43BA-9164-0E9844C185D4}" type="datetimeFigureOut">
               <a:rPr lang="en-AU" smtClean="0"/>
-              <a:t>12/12/2016</a:t>
+              <a:t>13/12/2016</a:t>
             </a:fld>
             <a:endParaRPr lang="en-AU"/>
           </a:p>
@@ -7760,6 +7766,177 @@
 </p:sld>
 </file>
 
+<file path=ppt/slides/slide10.xml><?xml version="1.0" encoding="utf-8"?>
+<p:sld xmlns:a="http://schemas.openxmlformats.org/drawingml/2006/main" xmlns:r="http://schemas.openxmlformats.org/officeDocument/2006/relationships" xmlns:p="http://schemas.openxmlformats.org/presentationml/2006/main">
+  <p:cSld>
+    <p:spTree>
+      <p:nvGrpSpPr>
+        <p:cNvPr id="1" name=""/>
+        <p:cNvGrpSpPr/>
+        <p:nvPr/>
+      </p:nvGrpSpPr>
+      <p:grpSpPr>
+        <a:xfrm>
+          <a:off x="0" y="0"/>
+          <a:ext cx="0" cy="0"/>
+          <a:chOff x="0" y="0"/>
+          <a:chExt cx="0" cy="0"/>
+        </a:xfrm>
+      </p:grpSpPr>
+      <p:sp>
+        <p:nvSpPr>
+          <p:cNvPr id="2" name="Title 1"/>
+          <p:cNvSpPr>
+            <a:spLocks noGrp="1"/>
+          </p:cNvSpPr>
+          <p:nvPr>
+            <p:ph type="title"/>
+          </p:nvPr>
+        </p:nvSpPr>
+        <p:spPr/>
+        <p:txBody>
+          <a:bodyPr/>
+          <a:lstStyle/>
+          <a:p>
+            <a:pPr algn="ctr"/>
+            <a:r>
+              <a:rPr lang="hu-HU" dirty="0" smtClean="0"/>
+              <a:t>Szólisták</a:t>
+            </a:r>
+            <a:endParaRPr lang="hu-HU" dirty="0"/>
+          </a:p>
+        </p:txBody>
+      </p:sp>
+      <p:sp>
+        <p:nvSpPr>
+          <p:cNvPr id="3" name="Content Placeholder 2"/>
+          <p:cNvSpPr>
+            <a:spLocks noGrp="1"/>
+          </p:cNvSpPr>
+          <p:nvPr>
+            <p:ph idx="1"/>
+          </p:nvPr>
+        </p:nvSpPr>
+        <p:spPr/>
+        <p:txBody>
+          <a:bodyPr/>
+          <a:lstStyle/>
+          <a:p>
+            <a:r>
+              <a:rPr lang="hu-HU" dirty="0" smtClean="0"/>
+              <a:t>Olyan szavak listálya amelyet gyakran használnak jelszóként (néha az adott nyelv összes értelmes szava is megtalálhazó egy ilyen listában)</a:t>
+            </a:r>
+          </a:p>
+          <a:p>
+            <a:r>
+              <a:rPr lang="hu-HU" dirty="0" smtClean="0"/>
+              <a:t>Ezeket a szavakat a program végig hasheli/próbálja</a:t>
+            </a:r>
+          </a:p>
+          <a:p>
+            <a:endParaRPr lang="hu-HU" dirty="0" smtClean="0"/>
+          </a:p>
+          <a:p>
+            <a:endParaRPr lang="hu-HU" dirty="0"/>
+          </a:p>
+        </p:txBody>
+      </p:sp>
+    </p:spTree>
+    <p:extLst>
+      <p:ext uri="{BB962C8B-B14F-4D97-AF65-F5344CB8AC3E}">
+        <p14:creationId xmlns:p14="http://schemas.microsoft.com/office/powerpoint/2010/main" val="3900384744"/>
+      </p:ext>
+    </p:extLst>
+  </p:cSld>
+  <p:clrMapOvr>
+    <a:masterClrMapping/>
+  </p:clrMapOvr>
+</p:sld>
+</file>
+
+<file path=ppt/slides/slide11.xml><?xml version="1.0" encoding="utf-8"?>
+<p:sld xmlns:a="http://schemas.openxmlformats.org/drawingml/2006/main" xmlns:r="http://schemas.openxmlformats.org/officeDocument/2006/relationships" xmlns:p="http://schemas.openxmlformats.org/presentationml/2006/main">
+  <p:cSld>
+    <p:spTree>
+      <p:nvGrpSpPr>
+        <p:cNvPr id="1" name=""/>
+        <p:cNvGrpSpPr/>
+        <p:nvPr/>
+      </p:nvGrpSpPr>
+      <p:grpSpPr>
+        <a:xfrm>
+          <a:off x="0" y="0"/>
+          <a:ext cx="0" cy="0"/>
+          <a:chOff x="0" y="0"/>
+          <a:chExt cx="0" cy="0"/>
+        </a:xfrm>
+      </p:grpSpPr>
+      <p:sp>
+        <p:nvSpPr>
+          <p:cNvPr id="2" name="Title 1"/>
+          <p:cNvSpPr>
+            <a:spLocks noGrp="1"/>
+          </p:cNvSpPr>
+          <p:nvPr>
+            <p:ph type="title"/>
+          </p:nvPr>
+        </p:nvSpPr>
+        <p:spPr/>
+        <p:txBody>
+          <a:bodyPr/>
+          <a:lstStyle/>
+          <a:p>
+            <a:pPr algn="ctr"/>
+            <a:r>
+              <a:rPr lang="hu-HU" dirty="0" smtClean="0"/>
+              <a:t>Trade-off módszerek</a:t>
+            </a:r>
+            <a:endParaRPr lang="hu-HU" dirty="0"/>
+          </a:p>
+        </p:txBody>
+      </p:sp>
+      <p:sp>
+        <p:nvSpPr>
+          <p:cNvPr id="3" name="Content Placeholder 2"/>
+          <p:cNvSpPr>
+            <a:spLocks noGrp="1"/>
+          </p:cNvSpPr>
+          <p:nvPr>
+            <p:ph idx="1"/>
+          </p:nvPr>
+        </p:nvSpPr>
+        <p:spPr/>
+        <p:txBody>
+          <a:bodyPr/>
+          <a:lstStyle/>
+          <a:p>
+            <a:r>
+              <a:rPr lang="hu-HU" dirty="0" smtClean="0"/>
+              <a:t>A trade-off lényege, hogy nem csak egy erőforrásra a számítási teljesítményre, vagy tárolóskapacitásra támaszkodik hanem többerőforrást keberve használ</a:t>
+            </a:r>
+          </a:p>
+          <a:p>
+            <a:r>
+              <a:rPr lang="hu-HU" dirty="0" smtClean="0"/>
+              <a:t>Így a brute force és az előgenerálás módszereket ötvözve fel lehet használni, vagy akár még pluszba, más módszereket és belekeverve hatékonyabbá teszi</a:t>
+            </a:r>
+            <a:endParaRPr lang="hu-HU" dirty="0"/>
+          </a:p>
+        </p:txBody>
+      </p:sp>
+    </p:spTree>
+    <p:extLst>
+      <p:ext uri="{BB962C8B-B14F-4D97-AF65-F5344CB8AC3E}">
+        <p14:creationId xmlns:p14="http://schemas.microsoft.com/office/powerpoint/2010/main" val="848698782"/>
+      </p:ext>
+    </p:extLst>
+  </p:cSld>
+  <p:clrMapOvr>
+    <a:masterClrMapping/>
+  </p:clrMapOvr>
+</p:sld>
+</file>
+
 <file path=ppt/slides/slide2.xml><?xml version="1.0" encoding="utf-8"?>
 <p:sld xmlns:a="http://schemas.openxmlformats.org/drawingml/2006/main" xmlns:r="http://schemas.openxmlformats.org/officeDocument/2006/relationships" xmlns:p="http://schemas.openxmlformats.org/presentationml/2006/main">
   <p:cSld>
@@ -9021,6 +9198,434 @@
     <p:extLst>
       <p:ext uri="{BB962C8B-B14F-4D97-AF65-F5344CB8AC3E}">
         <p14:creationId xmlns:p14="http://schemas.microsoft.com/office/powerpoint/2010/main" val="870625576"/>
+      </p:ext>
+    </p:extLst>
+  </p:cSld>
+  <p:clrMapOvr>
+    <a:masterClrMapping/>
+  </p:clrMapOvr>
+</p:sld>
+</file>
+
+<file path=ppt/slides/slide6.xml><?xml version="1.0" encoding="utf-8"?>
+<p:sld xmlns:a="http://schemas.openxmlformats.org/drawingml/2006/main" xmlns:r="http://schemas.openxmlformats.org/officeDocument/2006/relationships" xmlns:p="http://schemas.openxmlformats.org/presentationml/2006/main">
+  <p:cSld>
+    <p:spTree>
+      <p:nvGrpSpPr>
+        <p:cNvPr id="1" name=""/>
+        <p:cNvGrpSpPr/>
+        <p:nvPr/>
+      </p:nvGrpSpPr>
+      <p:grpSpPr>
+        <a:xfrm>
+          <a:off x="0" y="0"/>
+          <a:ext cx="0" cy="0"/>
+          <a:chOff x="0" y="0"/>
+          <a:chExt cx="0" cy="0"/>
+        </a:xfrm>
+      </p:grpSpPr>
+      <p:sp>
+        <p:nvSpPr>
+          <p:cNvPr id="2" name="Title 1"/>
+          <p:cNvSpPr>
+            <a:spLocks noGrp="1"/>
+          </p:cNvSpPr>
+          <p:nvPr>
+            <p:ph type="title"/>
+          </p:nvPr>
+        </p:nvSpPr>
+        <p:spPr/>
+        <p:txBody>
+          <a:bodyPr/>
+          <a:lstStyle/>
+          <a:p>
+            <a:pPr algn="ctr"/>
+            <a:r>
+              <a:rPr lang="hu-HU" dirty="0" smtClean="0"/>
+              <a:t>MySQL-323 Algoritmus</a:t>
+            </a:r>
+            <a:endParaRPr lang="hu-HU" dirty="0"/>
+          </a:p>
+        </p:txBody>
+      </p:sp>
+      <p:sp>
+        <p:nvSpPr>
+          <p:cNvPr id="3" name="Content Placeholder 2"/>
+          <p:cNvSpPr>
+            <a:spLocks noGrp="1"/>
+          </p:cNvSpPr>
+          <p:nvPr>
+            <p:ph idx="1"/>
+          </p:nvPr>
+        </p:nvSpPr>
+        <p:spPr/>
+        <p:txBody>
+          <a:bodyPr/>
+          <a:lstStyle/>
+          <a:p>
+            <a:r>
+              <a:rPr lang="hu-HU" dirty="0" smtClean="0"/>
+              <a:t>A nevéből is láthatóan a MySQL adatbázishoz fejlesztették ki.</a:t>
+            </a:r>
+          </a:p>
+          <a:p>
+            <a:r>
+              <a:rPr lang="hu-HU" dirty="0" smtClean="0"/>
+              <a:t>A „-323”-as végződés az adatbázis és a program verziószámát jelöli</a:t>
+            </a:r>
+          </a:p>
+          <a:p>
+            <a:r>
+              <a:rPr lang="hu-HU" dirty="0" smtClean="0"/>
+              <a:t>Késöbb leváltották a SHA-1-re hiszen ez a SHA-1 egyik módosiított változata amelyet megtalálhatunk a program forráskódjában is (hiszen open source)</a:t>
+            </a:r>
+          </a:p>
+          <a:p>
+            <a:endParaRPr lang="hu-HU" dirty="0"/>
+          </a:p>
+        </p:txBody>
+      </p:sp>
+    </p:spTree>
+    <p:extLst>
+      <p:ext uri="{BB962C8B-B14F-4D97-AF65-F5344CB8AC3E}">
+        <p14:creationId xmlns:p14="http://schemas.microsoft.com/office/powerpoint/2010/main" val="386107639"/>
+      </p:ext>
+    </p:extLst>
+  </p:cSld>
+  <p:clrMapOvr>
+    <a:masterClrMapping/>
+  </p:clrMapOvr>
+</p:sld>
+</file>
+
+<file path=ppt/slides/slide7.xml><?xml version="1.0" encoding="utf-8"?>
+<p:sld xmlns:a="http://schemas.openxmlformats.org/drawingml/2006/main" xmlns:r="http://schemas.openxmlformats.org/officeDocument/2006/relationships" xmlns:p="http://schemas.openxmlformats.org/presentationml/2006/main">
+  <p:cSld>
+    <p:spTree>
+      <p:nvGrpSpPr>
+        <p:cNvPr id="1" name=""/>
+        <p:cNvGrpSpPr/>
+        <p:nvPr/>
+      </p:nvGrpSpPr>
+      <p:grpSpPr>
+        <a:xfrm>
+          <a:off x="0" y="0"/>
+          <a:ext cx="0" cy="0"/>
+          <a:chOff x="0" y="0"/>
+          <a:chExt cx="0" cy="0"/>
+        </a:xfrm>
+      </p:grpSpPr>
+      <p:sp>
+        <p:nvSpPr>
+          <p:cNvPr id="2" name="Title 1"/>
+          <p:cNvSpPr>
+            <a:spLocks noGrp="1"/>
+          </p:cNvSpPr>
+          <p:nvPr>
+            <p:ph type="title"/>
+          </p:nvPr>
+        </p:nvSpPr>
+        <p:spPr/>
+        <p:txBody>
+          <a:bodyPr/>
+          <a:lstStyle/>
+          <a:p>
+            <a:pPr algn="ctr"/>
+            <a:r>
+              <a:rPr lang="hu-HU" dirty="0" smtClean="0"/>
+              <a:t>Törési módszerek</a:t>
+            </a:r>
+            <a:endParaRPr lang="hu-HU" dirty="0"/>
+          </a:p>
+        </p:txBody>
+      </p:sp>
+      <p:sp>
+        <p:nvSpPr>
+          <p:cNvPr id="3" name="Content Placeholder 2"/>
+          <p:cNvSpPr>
+            <a:spLocks noGrp="1"/>
+          </p:cNvSpPr>
+          <p:nvPr>
+            <p:ph idx="1"/>
+          </p:nvPr>
+        </p:nvSpPr>
+        <p:spPr/>
+        <p:txBody>
+          <a:bodyPr/>
+          <a:lstStyle/>
+          <a:p>
+            <a:r>
+              <a:rPr lang="hu-HU" dirty="0" smtClean="0"/>
+              <a:t>Brute Force</a:t>
+            </a:r>
+          </a:p>
+          <a:p>
+            <a:r>
+              <a:rPr lang="hu-HU" dirty="0" smtClean="0"/>
+              <a:t>Külső szabályok</a:t>
+            </a:r>
+          </a:p>
+          <a:p>
+            <a:r>
+              <a:rPr lang="hu-HU" dirty="0" smtClean="0"/>
+              <a:t>Szólisták</a:t>
+            </a:r>
+          </a:p>
+          <a:p>
+            <a:r>
+              <a:rPr lang="hu-HU" dirty="0" smtClean="0"/>
+              <a:t>Előgenerálás</a:t>
+            </a:r>
+          </a:p>
+          <a:p>
+            <a:r>
+              <a:rPr lang="hu-HU" dirty="0" smtClean="0"/>
+              <a:t>Trade-off módszerek</a:t>
+            </a:r>
+          </a:p>
+          <a:p>
+            <a:pPr marL="742950" lvl="2" indent="-342900"/>
+            <a:r>
+              <a:rPr lang="hu-HU" dirty="0"/>
+              <a:t>Criptanalitic time-memory trade-off</a:t>
+            </a:r>
+          </a:p>
+          <a:p>
+            <a:r>
+              <a:rPr lang="hu-HU" dirty="0" smtClean="0"/>
+              <a:t>Rainbow Tables</a:t>
+            </a:r>
+          </a:p>
+          <a:p>
+            <a:endParaRPr lang="hu-HU" dirty="0" smtClean="0"/>
+          </a:p>
+        </p:txBody>
+      </p:sp>
+    </p:spTree>
+    <p:extLst>
+      <p:ext uri="{BB962C8B-B14F-4D97-AF65-F5344CB8AC3E}">
+        <p14:creationId xmlns:p14="http://schemas.microsoft.com/office/powerpoint/2010/main" val="3046395983"/>
+      </p:ext>
+    </p:extLst>
+  </p:cSld>
+  <p:clrMapOvr>
+    <a:masterClrMapping/>
+  </p:clrMapOvr>
+</p:sld>
+</file>
+
+<file path=ppt/slides/slide8.xml><?xml version="1.0" encoding="utf-8"?>
+<p:sld xmlns:a="http://schemas.openxmlformats.org/drawingml/2006/main" xmlns:r="http://schemas.openxmlformats.org/officeDocument/2006/relationships" xmlns:p="http://schemas.openxmlformats.org/presentationml/2006/main">
+  <p:cSld>
+    <p:spTree>
+      <p:nvGrpSpPr>
+        <p:cNvPr id="1" name=""/>
+        <p:cNvGrpSpPr/>
+        <p:nvPr/>
+      </p:nvGrpSpPr>
+      <p:grpSpPr>
+        <a:xfrm>
+          <a:off x="0" y="0"/>
+          <a:ext cx="0" cy="0"/>
+          <a:chOff x="0" y="0"/>
+          <a:chExt cx="0" cy="0"/>
+        </a:xfrm>
+      </p:grpSpPr>
+      <p:sp>
+        <p:nvSpPr>
+          <p:cNvPr id="2" name="Title 1"/>
+          <p:cNvSpPr>
+            <a:spLocks noGrp="1"/>
+          </p:cNvSpPr>
+          <p:nvPr>
+            <p:ph type="title"/>
+          </p:nvPr>
+        </p:nvSpPr>
+        <p:spPr/>
+        <p:txBody>
+          <a:bodyPr/>
+          <a:lstStyle/>
+          <a:p>
+            <a:pPr algn="ctr"/>
+            <a:r>
+              <a:rPr lang="hu-HU" dirty="0" smtClean="0"/>
+              <a:t>Brute Force</a:t>
+            </a:r>
+            <a:endParaRPr lang="hu-HU" dirty="0"/>
+          </a:p>
+        </p:txBody>
+      </p:sp>
+      <p:sp>
+        <p:nvSpPr>
+          <p:cNvPr id="3" name="Content Placeholder 2"/>
+          <p:cNvSpPr>
+            <a:spLocks noGrp="1"/>
+          </p:cNvSpPr>
+          <p:nvPr>
+            <p:ph idx="1"/>
+          </p:nvPr>
+        </p:nvSpPr>
+        <p:spPr/>
+        <p:txBody>
+          <a:bodyPr/>
+          <a:lstStyle/>
+          <a:p>
+            <a:r>
+              <a:rPr lang="hu-HU" dirty="0" smtClean="0"/>
+              <a:t>Legegyszerűbb és legkevésbé hatékonyabb technika</a:t>
+            </a:r>
+          </a:p>
+          <a:p>
+            <a:r>
+              <a:rPr lang="hu-HU" dirty="0" smtClean="0"/>
+              <a:t>Minden lehetőséget kipróbálunk</a:t>
+            </a:r>
+          </a:p>
+          <a:p>
+            <a:r>
+              <a:rPr lang="hu-HU" dirty="0" smtClean="0"/>
+              <a:t>A lehetőségek kiszámításához a következő információk szükségesek hozzá:</a:t>
+            </a:r>
+          </a:p>
+          <a:p>
+            <a:pPr lvl="1"/>
+            <a:r>
+              <a:rPr lang="hu-HU" dirty="0" smtClean="0"/>
+              <a:t>Karakterkészlet</a:t>
+            </a:r>
+          </a:p>
+          <a:p>
+            <a:pPr lvl="1"/>
+            <a:r>
+              <a:rPr lang="hu-HU" dirty="0" smtClean="0"/>
+              <a:t>Kezdő és Véghossz</a:t>
+            </a:r>
+            <a:endParaRPr lang="hu-HU" dirty="0"/>
+          </a:p>
+        </p:txBody>
+      </p:sp>
+    </p:spTree>
+    <p:extLst>
+      <p:ext uri="{BB962C8B-B14F-4D97-AF65-F5344CB8AC3E}">
+        <p14:creationId xmlns:p14="http://schemas.microsoft.com/office/powerpoint/2010/main" val="2657127485"/>
+      </p:ext>
+    </p:extLst>
+  </p:cSld>
+  <p:clrMapOvr>
+    <a:masterClrMapping/>
+  </p:clrMapOvr>
+</p:sld>
+</file>
+
+<file path=ppt/slides/slide9.xml><?xml version="1.0" encoding="utf-8"?>
+<p:sld xmlns:a="http://schemas.openxmlformats.org/drawingml/2006/main" xmlns:r="http://schemas.openxmlformats.org/officeDocument/2006/relationships" xmlns:p="http://schemas.openxmlformats.org/presentationml/2006/main">
+  <p:cSld>
+    <p:spTree>
+      <p:nvGrpSpPr>
+        <p:cNvPr id="1" name=""/>
+        <p:cNvGrpSpPr/>
+        <p:nvPr/>
+      </p:nvGrpSpPr>
+      <p:grpSpPr>
+        <a:xfrm>
+          <a:off x="0" y="0"/>
+          <a:ext cx="0" cy="0"/>
+          <a:chOff x="0" y="0"/>
+          <a:chExt cx="0" cy="0"/>
+        </a:xfrm>
+      </p:grpSpPr>
+      <p:sp>
+        <p:nvSpPr>
+          <p:cNvPr id="2" name="Title 1"/>
+          <p:cNvSpPr>
+            <a:spLocks noGrp="1"/>
+          </p:cNvSpPr>
+          <p:nvPr>
+            <p:ph type="title"/>
+          </p:nvPr>
+        </p:nvSpPr>
+        <p:spPr/>
+        <p:txBody>
+          <a:bodyPr/>
+          <a:lstStyle/>
+          <a:p>
+            <a:pPr algn="ctr"/>
+            <a:r>
+              <a:rPr lang="hu-HU" dirty="0" smtClean="0"/>
+              <a:t>Külső szabályok</a:t>
+            </a:r>
+            <a:endParaRPr lang="hu-HU" dirty="0"/>
+          </a:p>
+        </p:txBody>
+      </p:sp>
+      <p:sp>
+        <p:nvSpPr>
+          <p:cNvPr id="3" name="Content Placeholder 2"/>
+          <p:cNvSpPr>
+            <a:spLocks noGrp="1"/>
+          </p:cNvSpPr>
+          <p:nvPr>
+            <p:ph idx="1"/>
+          </p:nvPr>
+        </p:nvSpPr>
+        <p:spPr/>
+        <p:txBody>
+          <a:bodyPr/>
+          <a:lstStyle/>
+          <a:p>
+            <a:r>
+              <a:rPr lang="hu-HU" dirty="0" smtClean="0"/>
+              <a:t>Jelszótörő alkalmazások használják</a:t>
+            </a:r>
+          </a:p>
+          <a:p>
+            <a:r>
+              <a:rPr lang="hu-HU" dirty="0" smtClean="0"/>
+              <a:t>Kulcsgenerálást generálási szabályok alapján végzik.</a:t>
+            </a:r>
+          </a:p>
+          <a:p>
+            <a:r>
+              <a:rPr lang="hu-HU" dirty="0" smtClean="0"/>
+              <a:t>Az ember jelszómegjegyzési szokásai alapján refukálhatjuk a lehetőségek számát</a:t>
+            </a:r>
+          </a:p>
+          <a:p>
+            <a:r>
+              <a:rPr lang="hu-HU" dirty="0" smtClean="0"/>
+              <a:t>Példák:</a:t>
+            </a:r>
+          </a:p>
+          <a:p>
+            <a:pPr lvl="1"/>
+            <a:r>
+              <a:rPr lang="hu-HU" dirty="0" smtClean="0"/>
+              <a:t>Maximális jelszó hosz: 7 karakter</a:t>
+            </a:r>
+          </a:p>
+          <a:p>
+            <a:pPr lvl="1"/>
+            <a:r>
+              <a:rPr lang="hu-HU" dirty="0" smtClean="0"/>
+              <a:t>Magánhangzók számokra cserélése (leet speak </a:t>
+            </a:r>
+            <a:r>
+              <a:rPr lang="hu-HU" dirty="0" smtClean="0">
+                <a:sym typeface="Wingdings" pitchFamily="2" charset="2"/>
+              </a:rPr>
+              <a:t> 1337 5p34k)</a:t>
+            </a:r>
+          </a:p>
+          <a:p>
+            <a:pPr lvl="1"/>
+            <a:endParaRPr lang="hu-HU" dirty="0" smtClean="0"/>
+          </a:p>
+        </p:txBody>
+      </p:sp>
+    </p:spTree>
+    <p:extLst>
+      <p:ext uri="{BB962C8B-B14F-4D97-AF65-F5344CB8AC3E}">
+        <p14:creationId xmlns:p14="http://schemas.microsoft.com/office/powerpoint/2010/main" val="3181206520"/>
       </p:ext>
     </p:extLst>
   </p:cSld>
@@ -9073,7 +9678,7 @@
     </a:clrScheme>
     <a:fontScheme name="Szálak">
       <a:majorFont>
-        <a:latin typeface="Century Gothic" panose="020B0502020202020204"/>
+        <a:latin typeface="Century Gothic"/>
         <a:ea typeface=""/>
         <a:cs typeface=""/>
         <a:font script="Jpan" typeface="メイリオ"/>
@@ -9108,7 +9713,7 @@
         <a:font script="Geor" typeface="Sylfaen"/>
       </a:majorFont>
       <a:minorFont>
-        <a:latin typeface="Century Gothic" panose="020B0502020202020204"/>
+        <a:latin typeface="Century Gothic"/>
         <a:ea typeface=""/>
         <a:cs typeface=""/>
         <a:font script="Jpan" typeface="メイリオ"/>
@@ -9267,7 +9872,7 @@
   <a:extraClrSchemeLst/>
   <a:extLst>
     <a:ext uri="{05A4C25C-085E-4340-85A3-A5531E510DB2}">
-      <thm15:themeFamily xmlns:thm15="http://schemas.microsoft.com/office/thememl/2012/main" name="Wisp" id="{7CB32D59-10C0-40DD-B7BD-2E94284A981C}" vid="{4F34B87B-9C7A-41AE-A6CB-48536223DFFD}"/>
+      <thm15:themeFamily xmlns:thm15="http://schemas.microsoft.com/office/thememl/2012/main" xmlns="" name="Wisp" id="{7CB32D59-10C0-40DD-B7BD-2E94284A981C}" vid="{4F34B87B-9C7A-41AE-A6CB-48536223DFFD}"/>
     </a:ext>
   </a:extLst>
 </a:theme>

</xml_diff>